<commit_message>
Bug fixes, performance tune-ups
This version contains many improvements in the timing and accuracy of ER
calls. One main addition is automatic selection of l_p parameter and a
script that can be used to run MUSIC with default parameters.
</commit_message>
<xml_diff>
--- a/Introduction to MUSIC.pptx
+++ b/Introduction to MUSIC.pptx
@@ -296,7 +296,7 @@
           <a:p>
             <a:fld id="{90F67765-78F1-40A0-969F-5CECE2C15D8F}" type="datetimeFigureOut">
               <a:rPr lang="en-US" smtClean="0"/>
-              <a:t>3/24/2015</a:t>
+              <a:t>4/8/2015</a:t>
             </a:fld>
             <a:endParaRPr lang="en-US"/>
           </a:p>
@@ -466,7 +466,7 @@
           <a:p>
             <a:fld id="{90F67765-78F1-40A0-969F-5CECE2C15D8F}" type="datetimeFigureOut">
               <a:rPr lang="en-US" smtClean="0"/>
-              <a:t>3/24/2015</a:t>
+              <a:t>4/8/2015</a:t>
             </a:fld>
             <a:endParaRPr lang="en-US"/>
           </a:p>
@@ -646,7 +646,7 @@
           <a:p>
             <a:fld id="{90F67765-78F1-40A0-969F-5CECE2C15D8F}" type="datetimeFigureOut">
               <a:rPr lang="en-US" smtClean="0"/>
-              <a:t>3/24/2015</a:t>
+              <a:t>4/8/2015</a:t>
             </a:fld>
             <a:endParaRPr lang="en-US"/>
           </a:p>
@@ -816,7 +816,7 @@
           <a:p>
             <a:fld id="{90F67765-78F1-40A0-969F-5CECE2C15D8F}" type="datetimeFigureOut">
               <a:rPr lang="en-US" smtClean="0"/>
-              <a:t>3/24/2015</a:t>
+              <a:t>4/8/2015</a:t>
             </a:fld>
             <a:endParaRPr lang="en-US"/>
           </a:p>
@@ -1062,7 +1062,7 @@
           <a:p>
             <a:fld id="{90F67765-78F1-40A0-969F-5CECE2C15D8F}" type="datetimeFigureOut">
               <a:rPr lang="en-US" smtClean="0"/>
-              <a:t>3/24/2015</a:t>
+              <a:t>4/8/2015</a:t>
             </a:fld>
             <a:endParaRPr lang="en-US"/>
           </a:p>
@@ -1350,7 +1350,7 @@
           <a:p>
             <a:fld id="{90F67765-78F1-40A0-969F-5CECE2C15D8F}" type="datetimeFigureOut">
               <a:rPr lang="en-US" smtClean="0"/>
-              <a:t>3/24/2015</a:t>
+              <a:t>4/8/2015</a:t>
             </a:fld>
             <a:endParaRPr lang="en-US"/>
           </a:p>
@@ -1772,7 +1772,7 @@
           <a:p>
             <a:fld id="{90F67765-78F1-40A0-969F-5CECE2C15D8F}" type="datetimeFigureOut">
               <a:rPr lang="en-US" smtClean="0"/>
-              <a:t>3/24/2015</a:t>
+              <a:t>4/8/2015</a:t>
             </a:fld>
             <a:endParaRPr lang="en-US"/>
           </a:p>
@@ -1890,7 +1890,7 @@
           <a:p>
             <a:fld id="{90F67765-78F1-40A0-969F-5CECE2C15D8F}" type="datetimeFigureOut">
               <a:rPr lang="en-US" smtClean="0"/>
-              <a:t>3/24/2015</a:t>
+              <a:t>4/8/2015</a:t>
             </a:fld>
             <a:endParaRPr lang="en-US"/>
           </a:p>
@@ -1985,7 +1985,7 @@
           <a:p>
             <a:fld id="{90F67765-78F1-40A0-969F-5CECE2C15D8F}" type="datetimeFigureOut">
               <a:rPr lang="en-US" smtClean="0"/>
-              <a:t>3/24/2015</a:t>
+              <a:t>4/8/2015</a:t>
             </a:fld>
             <a:endParaRPr lang="en-US"/>
           </a:p>
@@ -2262,7 +2262,7 @@
           <a:p>
             <a:fld id="{90F67765-78F1-40A0-969F-5CECE2C15D8F}" type="datetimeFigureOut">
               <a:rPr lang="en-US" smtClean="0"/>
-              <a:t>3/24/2015</a:t>
+              <a:t>4/8/2015</a:t>
             </a:fld>
             <a:endParaRPr lang="en-US"/>
           </a:p>
@@ -2515,7 +2515,7 @@
           <a:p>
             <a:fld id="{90F67765-78F1-40A0-969F-5CECE2C15D8F}" type="datetimeFigureOut">
               <a:rPr lang="en-US" smtClean="0"/>
-              <a:t>3/24/2015</a:t>
+              <a:t>4/8/2015</a:t>
             </a:fld>
             <a:endParaRPr lang="en-US"/>
           </a:p>
@@ -2728,7 +2728,7 @@
           <a:p>
             <a:fld id="{90F67765-78F1-40A0-969F-5CECE2C15D8F}" type="datetimeFigureOut">
               <a:rPr lang="en-US" smtClean="0"/>
-              <a:t>3/24/2015</a:t>
+              <a:t>4/8/2015</a:t>
             </a:fld>
             <a:endParaRPr lang="en-US"/>
           </a:p>
@@ -3912,7 +3912,7 @@
         </p:nvSpPr>
         <p:spPr>
           <a:xfrm>
-            <a:off x="457200" y="0"/>
+            <a:off x="457200" y="-304800"/>
             <a:ext cx="8229600" cy="1143000"/>
           </a:xfrm>
         </p:spPr>
@@ -3940,13 +3940,13 @@
         </p:nvSpPr>
         <p:spPr>
           <a:xfrm>
-            <a:off x="457200" y="990600"/>
-            <a:ext cx="8229600" cy="5638800"/>
+            <a:off x="457200" y="685800"/>
+            <a:ext cx="8229600" cy="6400800"/>
           </a:xfrm>
         </p:spPr>
         <p:txBody>
           <a:bodyPr>
-            <a:normAutofit fontScale="92500" lnSpcReduction="10000"/>
+            <a:normAutofit fontScale="77500" lnSpcReduction="20000"/>
           </a:bodyPr>
           <a:lstStyle/>
           <a:p>
@@ -4016,23 +4016,39 @@
               <a:buChar char="•"/>
             </a:pPr>
             <a:r>
-              <a:rPr lang="en-US" sz="1200" i="1" dirty="0" err="1"/>
+              <a:rPr lang="en-US" sz="1500" i="1" dirty="0" err="1"/>
               <a:t>l_win</a:t>
             </a:r>
             <a:r>
-              <a:rPr lang="en-US" sz="1200" i="1" dirty="0"/>
-              <a:t>: 1700	FNR: (FC:0.001) (p-val:0.001)	FPR: (FC:0.101) (p-val:0.055)	</a:t>
-            </a:r>
-            <a:r>
-              <a:rPr lang="en-US" sz="1200" i="1" dirty="0" err="1"/>
+              <a:rPr lang="en-US" sz="1500" i="1" dirty="0"/>
+              <a:t>: 1700	FNR: (FC:0.001) (p-val:0.001)	FPR: (</a:t>
+            </a:r>
+            <a:r>
+              <a:rPr lang="en-US" sz="1500" i="1" dirty="0" smtClean="0"/>
+              <a:t>FC:0.0101</a:t>
+            </a:r>
+            <a:r>
+              <a:rPr lang="en-US" sz="1500" i="1" dirty="0"/>
+              <a:t>) (</a:t>
+            </a:r>
+            <a:r>
+              <a:rPr lang="en-US" sz="1500" i="1" dirty="0" smtClean="0"/>
+              <a:t>p-val:0.0055</a:t>
+            </a:r>
+            <a:r>
+              <a:rPr lang="en-US" sz="1500" i="1" dirty="0"/>
+              <a:t>)	</a:t>
+            </a:r>
+            <a:r>
+              <a:rPr lang="en-US" sz="1500" i="1" dirty="0" err="1"/>
               <a:t>Sentitivity</a:t>
             </a:r>
             <a:r>
-              <a:rPr lang="en-US" sz="1200" i="1" dirty="0"/>
+              <a:rPr lang="en-US" sz="1500" i="1" dirty="0"/>
               <a:t>: </a:t>
             </a:r>
             <a:r>
-              <a:rPr lang="en-US" sz="1200" i="1" dirty="0" smtClean="0"/>
+              <a:rPr lang="en-US" sz="1500" i="1" dirty="0" smtClean="0"/>
               <a:t>0.999</a:t>
             </a:r>
           </a:p>
@@ -4066,7 +4082,7 @@
             </a:r>
             <a:r>
               <a:rPr lang="en-US" dirty="0" smtClean="0"/>
-              <a:t> such that where FPR for FC and p-value is below 10% (or very close)</a:t>
+              <a:t> such that where FPR for FC and p-value is below 1% (or very close)</a:t>
             </a:r>
           </a:p>
           <a:p>
@@ -4075,20 +4091,84 @@
               <a:buChar char="•"/>
             </a:pPr>
             <a:r>
-              <a:rPr lang="en-US" b="1" i="1" dirty="0" smtClean="0"/>
-              <a:t>Rule of thumb:</a:t>
-            </a:r>
-            <a:r>
-              <a:rPr lang="en-US" dirty="0" smtClean="0"/>
+              <a:rPr lang="en-US" dirty="0" smtClean="0"/>
+              <a:t>Personally, we like inspecting this file since it gives an idea about whether the enrichment worked well.</a:t>
+            </a:r>
+          </a:p>
+          <a:p>
+            <a:pPr lvl="2"/>
+            <a:r>
+              <a:rPr lang="en-US" b="1" dirty="0" smtClean="0"/>
+              <a:t>If you don’t want to look at this file run MUSIC with ‘-</a:t>
+            </a:r>
+            <a:r>
+              <a:rPr lang="en-US" b="1" dirty="0" err="1" smtClean="0"/>
+              <a:t>l_p</a:t>
+            </a:r>
+            <a:r>
+              <a:rPr lang="en-US" b="1" dirty="0" smtClean="0"/>
+              <a:t> 0’, which tells MUSIC to select </a:t>
+            </a:r>
+            <a:r>
+              <a:rPr lang="en-US" b="1" dirty="0" err="1" smtClean="0"/>
+              <a:t>l_p</a:t>
+            </a:r>
+            <a:r>
+              <a:rPr lang="en-US" b="1" dirty="0" smtClean="0"/>
+              <a:t> parameter automatically from the file above.</a:t>
+            </a:r>
+          </a:p>
+          <a:p>
+            <a:pPr lvl="3"/>
+            <a:r>
+              <a:rPr lang="en-US" dirty="0" smtClean="0"/>
+              <a:t>You have to still run </a:t>
+            </a:r>
+            <a:r>
+              <a:rPr lang="en-US" i="1" dirty="0"/>
+              <a:t>-</a:t>
+            </a:r>
+            <a:r>
+              <a:rPr lang="en-US" i="1" dirty="0" err="1"/>
+              <a:t>get_per_win_p_vals_FC</a:t>
+            </a:r>
+            <a:r>
+              <a:rPr lang="en-US" i="1" dirty="0"/>
               <a:t> </a:t>
             </a:r>
             <a:r>
+              <a:rPr lang="en-US" dirty="0" smtClean="0"/>
+              <a:t>for </a:t>
+            </a:r>
+            <a:r>
+              <a:rPr lang="en-US" smtClean="0"/>
+              <a:t>this </a:t>
+            </a:r>
+            <a:r>
+              <a:rPr lang="en-US" smtClean="0"/>
+              <a:t>to work</a:t>
+            </a:r>
+            <a:r>
+              <a:rPr lang="en-US" dirty="0" smtClean="0"/>
+              <a:t>.</a:t>
+            </a:r>
+          </a:p>
+          <a:p>
+            <a:pPr lvl="1">
+              <a:buFont typeface="Arial" pitchFamily="34" charset="0"/>
+              <a:buChar char="•"/>
+            </a:pPr>
+            <a:r>
+              <a:rPr lang="en-US" dirty="0" smtClean="0"/>
+              <a:t>We added a script under bin/</a:t>
+            </a:r>
+            <a:r>
               <a:rPr lang="en-US" dirty="0" err="1" smtClean="0"/>
-              <a:t>ChIP</a:t>
-            </a:r>
-            <a:r>
-              <a:rPr lang="en-US" dirty="0" smtClean="0"/>
-              <a:t> enrichment is good when sensitivity is close to 100% for the selected </a:t>
+              <a:t>run_MUSIC.csh</a:t>
+            </a:r>
+            <a:r>
+              <a:rPr lang="en-US" dirty="0" smtClean="0"/>
+              <a:t> that automatically selects and runs MUSIC with the best </a:t>
             </a:r>
             <a:r>
               <a:rPr lang="en-US" dirty="0" err="1" smtClean="0"/>
@@ -4096,8 +4176,15 @@
             </a:r>
             <a:r>
               <a:rPr lang="en-US" dirty="0" smtClean="0"/>
-              <a:t>.</a:t>
-            </a:r>
+              <a:t> parameter. When you do not want to deal with looking at this file, use this script.</a:t>
+            </a:r>
+          </a:p>
+          <a:p>
+            <a:pPr lvl="1">
+              <a:buFont typeface="Arial" pitchFamily="34" charset="0"/>
+              <a:buChar char="•"/>
+            </a:pPr>
+            <a:endParaRPr lang="en-US" dirty="0" smtClean="0"/>
           </a:p>
           <a:p>
             <a:pPr lvl="1">
@@ -4884,11 +4971,7 @@
             </a:r>
             <a:r>
               <a:rPr lang="en-US" dirty="0" smtClean="0"/>
-              <a:t> to specify it</a:t>
-            </a:r>
-            <a:r>
-              <a:rPr lang="en-US" dirty="0" smtClean="0"/>
-              <a:t>.</a:t>
+              <a:t> to specify it.</a:t>
             </a:r>
           </a:p>
           <a:p>

</xml_diff>